<commit_message>
training curriculum revised to reflect new updates with exam
</commit_message>
<xml_diff>
--- a/CCA-175-class.pptx
+++ b/CCA-175-class.pptx
@@ -11,9 +11,8 @@
     <p:sldId id="263" r:id="rId5"/>
     <p:sldId id="259" r:id="rId6"/>
     <p:sldId id="261" r:id="rId7"/>
-    <p:sldId id="262" r:id="rId8"/>
-    <p:sldId id="264" r:id="rId9"/>
-    <p:sldId id="265" r:id="rId10"/>
+    <p:sldId id="264" r:id="rId8"/>
+    <p:sldId id="265" r:id="rId9"/>
   </p:sldIdLst>
   <p:sldSz cx="12192000" cy="6858000"/>
   <p:notesSz cx="6858000" cy="9144000"/>
@@ -162,7 +161,7 @@
           </a:lstStyle>
           <a:p>
             <a:r>
-              <a:rPr lang="en-US" smtClean="0"/>
+              <a:rPr lang="en-US"/>
               <a:t>Click to edit Master title style</a:t>
             </a:r>
             <a:endParaRPr lang="en-GB"/>
@@ -227,7 +226,7 @@
           </a:lstStyle>
           <a:p>
             <a:r>
-              <a:rPr lang="en-US" smtClean="0"/>
+              <a:rPr lang="en-US"/>
               <a:t>Click to edit Master subtitle style</a:t>
             </a:r>
             <a:endParaRPr lang="en-GB"/>
@@ -251,7 +250,7 @@
           <a:p>
             <a:fld id="{9B03B8EA-57A4-4F2E-A5B3-3FEA55804EC2}" type="datetimeFigureOut">
               <a:rPr lang="en-GB" smtClean="0"/>
-              <a:t>10/07/2016</a:t>
+              <a:t>03/12/2018</a:t>
             </a:fld>
             <a:endParaRPr lang="en-GB"/>
           </a:p>
@@ -345,7 +344,7 @@
           <a:lstStyle/>
           <a:p>
             <a:r>
-              <a:rPr lang="en-US" smtClean="0"/>
+              <a:rPr lang="en-US"/>
               <a:t>Click to edit Master title style</a:t>
             </a:r>
             <a:endParaRPr lang="en-GB"/>
@@ -369,35 +368,35 @@
           <a:p>
             <a:pPr lvl="0"/>
             <a:r>
-              <a:rPr lang="en-US" smtClean="0"/>
+              <a:rPr lang="en-US"/>
               <a:t>Click to edit Master text styles</a:t>
             </a:r>
           </a:p>
           <a:p>
             <a:pPr lvl="1"/>
             <a:r>
-              <a:rPr lang="en-US" smtClean="0"/>
+              <a:rPr lang="en-US"/>
               <a:t>Second level</a:t>
             </a:r>
           </a:p>
           <a:p>
             <a:pPr lvl="2"/>
             <a:r>
-              <a:rPr lang="en-US" smtClean="0"/>
+              <a:rPr lang="en-US"/>
               <a:t>Third level</a:t>
             </a:r>
           </a:p>
           <a:p>
             <a:pPr lvl="3"/>
             <a:r>
-              <a:rPr lang="en-US" smtClean="0"/>
+              <a:rPr lang="en-US"/>
               <a:t>Fourth level</a:t>
             </a:r>
           </a:p>
           <a:p>
             <a:pPr lvl="4"/>
             <a:r>
-              <a:rPr lang="en-US" smtClean="0"/>
+              <a:rPr lang="en-US"/>
               <a:t>Fifth level</a:t>
             </a:r>
             <a:endParaRPr lang="en-GB"/>
@@ -421,7 +420,7 @@
           <a:p>
             <a:fld id="{9B03B8EA-57A4-4F2E-A5B3-3FEA55804EC2}" type="datetimeFigureOut">
               <a:rPr lang="en-GB" smtClean="0"/>
-              <a:t>10/07/2016</a:t>
+              <a:t>03/12/2018</a:t>
             </a:fld>
             <a:endParaRPr lang="en-GB"/>
           </a:p>
@@ -520,7 +519,7 @@
           <a:lstStyle/>
           <a:p>
             <a:r>
-              <a:rPr lang="en-US" smtClean="0"/>
+              <a:rPr lang="en-US"/>
               <a:t>Click to edit Master title style</a:t>
             </a:r>
             <a:endParaRPr lang="en-GB"/>
@@ -549,35 +548,35 @@
           <a:p>
             <a:pPr lvl="0"/>
             <a:r>
-              <a:rPr lang="en-US" smtClean="0"/>
+              <a:rPr lang="en-US"/>
               <a:t>Click to edit Master text styles</a:t>
             </a:r>
           </a:p>
           <a:p>
             <a:pPr lvl="1"/>
             <a:r>
-              <a:rPr lang="en-US" smtClean="0"/>
+              <a:rPr lang="en-US"/>
               <a:t>Second level</a:t>
             </a:r>
           </a:p>
           <a:p>
             <a:pPr lvl="2"/>
             <a:r>
-              <a:rPr lang="en-US" smtClean="0"/>
+              <a:rPr lang="en-US"/>
               <a:t>Third level</a:t>
             </a:r>
           </a:p>
           <a:p>
             <a:pPr lvl="3"/>
             <a:r>
-              <a:rPr lang="en-US" smtClean="0"/>
+              <a:rPr lang="en-US"/>
               <a:t>Fourth level</a:t>
             </a:r>
           </a:p>
           <a:p>
             <a:pPr lvl="4"/>
             <a:r>
-              <a:rPr lang="en-US" smtClean="0"/>
+              <a:rPr lang="en-US"/>
               <a:t>Fifth level</a:t>
             </a:r>
             <a:endParaRPr lang="en-GB"/>
@@ -601,7 +600,7 @@
           <a:p>
             <a:fld id="{9B03B8EA-57A4-4F2E-A5B3-3FEA55804EC2}" type="datetimeFigureOut">
               <a:rPr lang="en-GB" smtClean="0"/>
-              <a:t>10/07/2016</a:t>
+              <a:t>03/12/2018</a:t>
             </a:fld>
             <a:endParaRPr lang="en-GB"/>
           </a:p>
@@ -695,7 +694,7 @@
           <a:lstStyle/>
           <a:p>
             <a:r>
-              <a:rPr lang="en-US" smtClean="0"/>
+              <a:rPr lang="en-US"/>
               <a:t>Click to edit Master title style</a:t>
             </a:r>
             <a:endParaRPr lang="en-GB"/>
@@ -719,35 +718,35 @@
           <a:p>
             <a:pPr lvl="0"/>
             <a:r>
-              <a:rPr lang="en-US" smtClean="0"/>
+              <a:rPr lang="en-US"/>
               <a:t>Click to edit Master text styles</a:t>
             </a:r>
           </a:p>
           <a:p>
             <a:pPr lvl="1"/>
             <a:r>
-              <a:rPr lang="en-US" smtClean="0"/>
+              <a:rPr lang="en-US"/>
               <a:t>Second level</a:t>
             </a:r>
           </a:p>
           <a:p>
             <a:pPr lvl="2"/>
             <a:r>
-              <a:rPr lang="en-US" smtClean="0"/>
+              <a:rPr lang="en-US"/>
               <a:t>Third level</a:t>
             </a:r>
           </a:p>
           <a:p>
             <a:pPr lvl="3"/>
             <a:r>
-              <a:rPr lang="en-US" smtClean="0"/>
+              <a:rPr lang="en-US"/>
               <a:t>Fourth level</a:t>
             </a:r>
           </a:p>
           <a:p>
             <a:pPr lvl="4"/>
             <a:r>
-              <a:rPr lang="en-US" smtClean="0"/>
+              <a:rPr lang="en-US"/>
               <a:t>Fifth level</a:t>
             </a:r>
             <a:endParaRPr lang="en-GB"/>
@@ -771,7 +770,7 @@
           <a:p>
             <a:fld id="{9B03B8EA-57A4-4F2E-A5B3-3FEA55804EC2}" type="datetimeFigureOut">
               <a:rPr lang="en-GB" smtClean="0"/>
-              <a:t>10/07/2016</a:t>
+              <a:t>03/12/2018</a:t>
             </a:fld>
             <a:endParaRPr lang="en-GB"/>
           </a:p>
@@ -874,7 +873,7 @@
           </a:lstStyle>
           <a:p>
             <a:r>
-              <a:rPr lang="en-US" smtClean="0"/>
+              <a:rPr lang="en-US"/>
               <a:t>Click to edit Master title style</a:t>
             </a:r>
             <a:endParaRPr lang="en-GB"/>
@@ -994,7 +993,7 @@
           <a:p>
             <a:pPr lvl="0"/>
             <a:r>
-              <a:rPr lang="en-US" smtClean="0"/>
+              <a:rPr lang="en-US"/>
               <a:t>Click to edit Master text styles</a:t>
             </a:r>
           </a:p>
@@ -1017,7 +1016,7 @@
           <a:p>
             <a:fld id="{9B03B8EA-57A4-4F2E-A5B3-3FEA55804EC2}" type="datetimeFigureOut">
               <a:rPr lang="en-GB" smtClean="0"/>
-              <a:t>10/07/2016</a:t>
+              <a:t>03/12/2018</a:t>
             </a:fld>
             <a:endParaRPr lang="en-GB"/>
           </a:p>
@@ -1111,7 +1110,7 @@
           <a:lstStyle/>
           <a:p>
             <a:r>
-              <a:rPr lang="en-US" smtClean="0"/>
+              <a:rPr lang="en-US"/>
               <a:t>Click to edit Master title style</a:t>
             </a:r>
             <a:endParaRPr lang="en-GB"/>
@@ -1140,35 +1139,35 @@
           <a:p>
             <a:pPr lvl="0"/>
             <a:r>
-              <a:rPr lang="en-US" smtClean="0"/>
+              <a:rPr lang="en-US"/>
               <a:t>Click to edit Master text styles</a:t>
             </a:r>
           </a:p>
           <a:p>
             <a:pPr lvl="1"/>
             <a:r>
-              <a:rPr lang="en-US" smtClean="0"/>
+              <a:rPr lang="en-US"/>
               <a:t>Second level</a:t>
             </a:r>
           </a:p>
           <a:p>
             <a:pPr lvl="2"/>
             <a:r>
-              <a:rPr lang="en-US" smtClean="0"/>
+              <a:rPr lang="en-US"/>
               <a:t>Third level</a:t>
             </a:r>
           </a:p>
           <a:p>
             <a:pPr lvl="3"/>
             <a:r>
-              <a:rPr lang="en-US" smtClean="0"/>
+              <a:rPr lang="en-US"/>
               <a:t>Fourth level</a:t>
             </a:r>
           </a:p>
           <a:p>
             <a:pPr lvl="4"/>
             <a:r>
-              <a:rPr lang="en-US" smtClean="0"/>
+              <a:rPr lang="en-US"/>
               <a:t>Fifth level</a:t>
             </a:r>
             <a:endParaRPr lang="en-GB"/>
@@ -1197,35 +1196,35 @@
           <a:p>
             <a:pPr lvl="0"/>
             <a:r>
-              <a:rPr lang="en-US" smtClean="0"/>
+              <a:rPr lang="en-US"/>
               <a:t>Click to edit Master text styles</a:t>
             </a:r>
           </a:p>
           <a:p>
             <a:pPr lvl="1"/>
             <a:r>
-              <a:rPr lang="en-US" smtClean="0"/>
+              <a:rPr lang="en-US"/>
               <a:t>Second level</a:t>
             </a:r>
           </a:p>
           <a:p>
             <a:pPr lvl="2"/>
             <a:r>
-              <a:rPr lang="en-US" smtClean="0"/>
+              <a:rPr lang="en-US"/>
               <a:t>Third level</a:t>
             </a:r>
           </a:p>
           <a:p>
             <a:pPr lvl="3"/>
             <a:r>
-              <a:rPr lang="en-US" smtClean="0"/>
+              <a:rPr lang="en-US"/>
               <a:t>Fourth level</a:t>
             </a:r>
           </a:p>
           <a:p>
             <a:pPr lvl="4"/>
             <a:r>
-              <a:rPr lang="en-US" smtClean="0"/>
+              <a:rPr lang="en-US"/>
               <a:t>Fifth level</a:t>
             </a:r>
             <a:endParaRPr lang="en-GB"/>
@@ -1249,7 +1248,7 @@
           <a:p>
             <a:fld id="{9B03B8EA-57A4-4F2E-A5B3-3FEA55804EC2}" type="datetimeFigureOut">
               <a:rPr lang="en-GB" smtClean="0"/>
-              <a:t>10/07/2016</a:t>
+              <a:t>03/12/2018</a:t>
             </a:fld>
             <a:endParaRPr lang="en-GB"/>
           </a:p>
@@ -1348,7 +1347,7 @@
           <a:lstStyle/>
           <a:p>
             <a:r>
-              <a:rPr lang="en-US" smtClean="0"/>
+              <a:rPr lang="en-US"/>
               <a:t>Click to edit Master title style</a:t>
             </a:r>
             <a:endParaRPr lang="en-GB"/>
@@ -1414,7 +1413,7 @@
           <a:p>
             <a:pPr lvl="0"/>
             <a:r>
-              <a:rPr lang="en-US" smtClean="0"/>
+              <a:rPr lang="en-US"/>
               <a:t>Click to edit Master text styles</a:t>
             </a:r>
           </a:p>
@@ -1442,35 +1441,35 @@
           <a:p>
             <a:pPr lvl="0"/>
             <a:r>
-              <a:rPr lang="en-US" smtClean="0"/>
+              <a:rPr lang="en-US"/>
               <a:t>Click to edit Master text styles</a:t>
             </a:r>
           </a:p>
           <a:p>
             <a:pPr lvl="1"/>
             <a:r>
-              <a:rPr lang="en-US" smtClean="0"/>
+              <a:rPr lang="en-US"/>
               <a:t>Second level</a:t>
             </a:r>
           </a:p>
           <a:p>
             <a:pPr lvl="2"/>
             <a:r>
-              <a:rPr lang="en-US" smtClean="0"/>
+              <a:rPr lang="en-US"/>
               <a:t>Third level</a:t>
             </a:r>
           </a:p>
           <a:p>
             <a:pPr lvl="3"/>
             <a:r>
-              <a:rPr lang="en-US" smtClean="0"/>
+              <a:rPr lang="en-US"/>
               <a:t>Fourth level</a:t>
             </a:r>
           </a:p>
           <a:p>
             <a:pPr lvl="4"/>
             <a:r>
-              <a:rPr lang="en-US" smtClean="0"/>
+              <a:rPr lang="en-US"/>
               <a:t>Fifth level</a:t>
             </a:r>
             <a:endParaRPr lang="en-GB"/>
@@ -1536,7 +1535,7 @@
           <a:p>
             <a:pPr lvl="0"/>
             <a:r>
-              <a:rPr lang="en-US" smtClean="0"/>
+              <a:rPr lang="en-US"/>
               <a:t>Click to edit Master text styles</a:t>
             </a:r>
           </a:p>
@@ -1564,35 +1563,35 @@
           <a:p>
             <a:pPr lvl="0"/>
             <a:r>
-              <a:rPr lang="en-US" smtClean="0"/>
+              <a:rPr lang="en-US"/>
               <a:t>Click to edit Master text styles</a:t>
             </a:r>
           </a:p>
           <a:p>
             <a:pPr lvl="1"/>
             <a:r>
-              <a:rPr lang="en-US" smtClean="0"/>
+              <a:rPr lang="en-US"/>
               <a:t>Second level</a:t>
             </a:r>
           </a:p>
           <a:p>
             <a:pPr lvl="2"/>
             <a:r>
-              <a:rPr lang="en-US" smtClean="0"/>
+              <a:rPr lang="en-US"/>
               <a:t>Third level</a:t>
             </a:r>
           </a:p>
           <a:p>
             <a:pPr lvl="3"/>
             <a:r>
-              <a:rPr lang="en-US" smtClean="0"/>
+              <a:rPr lang="en-US"/>
               <a:t>Fourth level</a:t>
             </a:r>
           </a:p>
           <a:p>
             <a:pPr lvl="4"/>
             <a:r>
-              <a:rPr lang="en-US" smtClean="0"/>
+              <a:rPr lang="en-US"/>
               <a:t>Fifth level</a:t>
             </a:r>
             <a:endParaRPr lang="en-GB"/>
@@ -1616,7 +1615,7 @@
           <a:p>
             <a:fld id="{9B03B8EA-57A4-4F2E-A5B3-3FEA55804EC2}" type="datetimeFigureOut">
               <a:rPr lang="en-GB" smtClean="0"/>
-              <a:t>10/07/2016</a:t>
+              <a:t>03/12/2018</a:t>
             </a:fld>
             <a:endParaRPr lang="en-GB"/>
           </a:p>
@@ -1710,7 +1709,7 @@
           <a:lstStyle/>
           <a:p>
             <a:r>
-              <a:rPr lang="en-US" smtClean="0"/>
+              <a:rPr lang="en-US"/>
               <a:t>Click to edit Master title style</a:t>
             </a:r>
             <a:endParaRPr lang="en-GB"/>
@@ -1734,7 +1733,7 @@
           <a:p>
             <a:fld id="{9B03B8EA-57A4-4F2E-A5B3-3FEA55804EC2}" type="datetimeFigureOut">
               <a:rPr lang="en-GB" smtClean="0"/>
-              <a:t>10/07/2016</a:t>
+              <a:t>03/12/2018</a:t>
             </a:fld>
             <a:endParaRPr lang="en-GB"/>
           </a:p>
@@ -1829,7 +1828,7 @@
           <a:p>
             <a:fld id="{9B03B8EA-57A4-4F2E-A5B3-3FEA55804EC2}" type="datetimeFigureOut">
               <a:rPr lang="en-GB" smtClean="0"/>
-              <a:t>10/07/2016</a:t>
+              <a:t>03/12/2018</a:t>
             </a:fld>
             <a:endParaRPr lang="en-GB"/>
           </a:p>
@@ -1932,7 +1931,7 @@
           </a:lstStyle>
           <a:p>
             <a:r>
-              <a:rPr lang="en-US" smtClean="0"/>
+              <a:rPr lang="en-US"/>
               <a:t>Click to edit Master title style</a:t>
             </a:r>
             <a:endParaRPr lang="en-GB"/>
@@ -1989,35 +1988,35 @@
           <a:p>
             <a:pPr lvl="0"/>
             <a:r>
-              <a:rPr lang="en-US" smtClean="0"/>
+              <a:rPr lang="en-US"/>
               <a:t>Click to edit Master text styles</a:t>
             </a:r>
           </a:p>
           <a:p>
             <a:pPr lvl="1"/>
             <a:r>
-              <a:rPr lang="en-US" smtClean="0"/>
+              <a:rPr lang="en-US"/>
               <a:t>Second level</a:t>
             </a:r>
           </a:p>
           <a:p>
             <a:pPr lvl="2"/>
             <a:r>
-              <a:rPr lang="en-US" smtClean="0"/>
+              <a:rPr lang="en-US"/>
               <a:t>Third level</a:t>
             </a:r>
           </a:p>
           <a:p>
             <a:pPr lvl="3"/>
             <a:r>
-              <a:rPr lang="en-US" smtClean="0"/>
+              <a:rPr lang="en-US"/>
               <a:t>Fourth level</a:t>
             </a:r>
           </a:p>
           <a:p>
             <a:pPr lvl="4"/>
             <a:r>
-              <a:rPr lang="en-US" smtClean="0"/>
+              <a:rPr lang="en-US"/>
               <a:t>Fifth level</a:t>
             </a:r>
             <a:endParaRPr lang="en-GB"/>
@@ -2083,7 +2082,7 @@
           <a:p>
             <a:pPr lvl="0"/>
             <a:r>
-              <a:rPr lang="en-US" smtClean="0"/>
+              <a:rPr lang="en-US"/>
               <a:t>Click to edit Master text styles</a:t>
             </a:r>
           </a:p>
@@ -2106,7 +2105,7 @@
           <a:p>
             <a:fld id="{9B03B8EA-57A4-4F2E-A5B3-3FEA55804EC2}" type="datetimeFigureOut">
               <a:rPr lang="en-GB" smtClean="0"/>
-              <a:t>10/07/2016</a:t>
+              <a:t>03/12/2018</a:t>
             </a:fld>
             <a:endParaRPr lang="en-GB"/>
           </a:p>
@@ -2209,7 +2208,7 @@
           </a:lstStyle>
           <a:p>
             <a:r>
-              <a:rPr lang="en-US" smtClean="0"/>
+              <a:rPr lang="en-US"/>
               <a:t>Click to edit Master title style</a:t>
             </a:r>
             <a:endParaRPr lang="en-GB"/>
@@ -2336,7 +2335,7 @@
           <a:p>
             <a:pPr lvl="0"/>
             <a:r>
-              <a:rPr lang="en-US" smtClean="0"/>
+              <a:rPr lang="en-US"/>
               <a:t>Click to edit Master text styles</a:t>
             </a:r>
           </a:p>
@@ -2359,7 +2358,7 @@
           <a:p>
             <a:fld id="{9B03B8EA-57A4-4F2E-A5B3-3FEA55804EC2}" type="datetimeFigureOut">
               <a:rPr lang="en-GB" smtClean="0"/>
-              <a:t>10/07/2016</a:t>
+              <a:t>03/12/2018</a:t>
             </a:fld>
             <a:endParaRPr lang="en-GB"/>
           </a:p>
@@ -2468,7 +2467,7 @@
           <a:lstStyle/>
           <a:p>
             <a:r>
-              <a:rPr lang="en-US" smtClean="0"/>
+              <a:rPr lang="en-US"/>
               <a:t>Click to edit Master title style</a:t>
             </a:r>
             <a:endParaRPr lang="en-GB"/>
@@ -2502,35 +2501,35 @@
           <a:p>
             <a:pPr lvl="0"/>
             <a:r>
-              <a:rPr lang="en-US" smtClean="0"/>
+              <a:rPr lang="en-US"/>
               <a:t>Click to edit Master text styles</a:t>
             </a:r>
           </a:p>
           <a:p>
             <a:pPr lvl="1"/>
             <a:r>
-              <a:rPr lang="en-US" smtClean="0"/>
+              <a:rPr lang="en-US"/>
               <a:t>Second level</a:t>
             </a:r>
           </a:p>
           <a:p>
             <a:pPr lvl="2"/>
             <a:r>
-              <a:rPr lang="en-US" smtClean="0"/>
+              <a:rPr lang="en-US"/>
               <a:t>Third level</a:t>
             </a:r>
           </a:p>
           <a:p>
             <a:pPr lvl="3"/>
             <a:r>
-              <a:rPr lang="en-US" smtClean="0"/>
+              <a:rPr lang="en-US"/>
               <a:t>Fourth level</a:t>
             </a:r>
           </a:p>
           <a:p>
             <a:pPr lvl="4"/>
             <a:r>
-              <a:rPr lang="en-US" smtClean="0"/>
+              <a:rPr lang="en-US"/>
               <a:t>Fifth level</a:t>
             </a:r>
             <a:endParaRPr lang="en-GB"/>
@@ -2572,7 +2571,7 @@
           <a:p>
             <a:fld id="{9B03B8EA-57A4-4F2E-A5B3-3FEA55804EC2}" type="datetimeFigureOut">
               <a:rPr lang="en-GB" smtClean="0"/>
-              <a:t>10/07/2016</a:t>
+              <a:t>03/12/2018</a:t>
             </a:fld>
             <a:endParaRPr lang="en-GB"/>
           </a:p>
@@ -3009,13 +3008,6 @@
   <p:clrMapOvr>
     <a:masterClrMapping/>
   </p:clrMapOvr>
-  <p:timing>
-    <p:tnLst>
-      <p:par>
-        <p:cTn id="1" dur="indefinite" restart="never" nodeType="tmRoot"/>
-      </p:par>
-    </p:tnLst>
-  </p:timing>
 </p:sld>
 </file>
 
@@ -3036,9 +3028,49 @@
           <a:chExt cx="0" cy="0"/>
         </a:xfrm>
       </p:grpSpPr>
+      <p:sp>
+        <p:nvSpPr>
+          <p:cNvPr id="5" name="TextBox 4"/>
+          <p:cNvSpPr txBox="1"/>
+          <p:nvPr/>
+        </p:nvSpPr>
+        <p:spPr>
+          <a:xfrm>
+            <a:off x="665408" y="386366"/>
+            <a:ext cx="10386208" cy="646331"/>
+          </a:xfrm>
+          <a:prstGeom prst="rect">
+            <a:avLst/>
+          </a:prstGeom>
+          <a:noFill/>
+        </p:spPr>
+        <p:txBody>
+          <a:bodyPr wrap="square" rtlCol="0">
+            <a:spAutoFit/>
+          </a:bodyPr>
+          <a:lstStyle/>
+          <a:p>
+            <a:r>
+              <a:rPr lang="en-US" sz="3600" dirty="0">
+                <a:latin typeface="Book Antiqua" panose="02040602050305030304" pitchFamily="18" charset="0"/>
+              </a:rPr>
+              <a:t>EXAM DETAILS</a:t>
+            </a:r>
+            <a:endParaRPr lang="en-GB" sz="3600" dirty="0">
+              <a:latin typeface="Book Antiqua" panose="02040602050305030304" pitchFamily="18" charset="0"/>
+            </a:endParaRPr>
+          </a:p>
+        </p:txBody>
+      </p:sp>
       <p:pic>
         <p:nvPicPr>
-          <p:cNvPr id="4" name="Picture 3"/>
+          <p:cNvPr id="2" name="Picture 1">
+            <a:extLst>
+              <a:ext uri="{FF2B5EF4-FFF2-40B4-BE49-F238E27FC236}">
+                <a16:creationId xmlns:a16="http://schemas.microsoft.com/office/drawing/2014/main" id="{E00AB61B-F4B7-4ADB-83FC-ECA1B0A924E3}"/>
+              </a:ext>
+            </a:extLst>
+          </p:cNvPr>
           <p:cNvPicPr>
             <a:picLocks noChangeAspect="1"/>
           </p:cNvPicPr>
@@ -3052,48 +3084,14 @@
         </p:blipFill>
         <p:spPr>
           <a:xfrm>
-            <a:off x="748349" y="1396352"/>
-            <a:ext cx="10220325" cy="2828925"/>
+            <a:off x="789132" y="1476808"/>
+            <a:ext cx="7658100" cy="3571875"/>
           </a:xfrm>
           <a:prstGeom prst="rect">
             <a:avLst/>
           </a:prstGeom>
         </p:spPr>
       </p:pic>
-      <p:sp>
-        <p:nvSpPr>
-          <p:cNvPr id="5" name="TextBox 4"/>
-          <p:cNvSpPr txBox="1"/>
-          <p:nvPr/>
-        </p:nvSpPr>
-        <p:spPr>
-          <a:xfrm>
-            <a:off x="665408" y="386366"/>
-            <a:ext cx="10386208" cy="646331"/>
-          </a:xfrm>
-          <a:prstGeom prst="rect">
-            <a:avLst/>
-          </a:prstGeom>
-          <a:noFill/>
-        </p:spPr>
-        <p:txBody>
-          <a:bodyPr wrap="square" rtlCol="0">
-            <a:spAutoFit/>
-          </a:bodyPr>
-          <a:lstStyle/>
-          <a:p>
-            <a:r>
-              <a:rPr lang="en-US" sz="3600" dirty="0" smtClean="0">
-                <a:latin typeface="Book Antiqua" panose="02040602050305030304" pitchFamily="18" charset="0"/>
-              </a:rPr>
-              <a:t>EXAM DETAILS</a:t>
-            </a:r>
-            <a:endParaRPr lang="en-GB" sz="3600" dirty="0">
-              <a:latin typeface="Book Antiqua" panose="02040602050305030304" pitchFamily="18" charset="0"/>
-            </a:endParaRPr>
-          </a:p>
-        </p:txBody>
-      </p:sp>
     </p:spTree>
     <p:extLst>
       <p:ext uri="{BB962C8B-B14F-4D97-AF65-F5344CB8AC3E}">
@@ -3104,13 +3102,6 @@
   <p:clrMapOvr>
     <a:masterClrMapping/>
   </p:clrMapOvr>
-  <p:timing>
-    <p:tnLst>
-      <p:par>
-        <p:cTn id="1" dur="indefinite" restart="never" nodeType="tmRoot"/>
-      </p:par>
-    </p:tnLst>
-  </p:timing>
 </p:sld>
 </file>
 
@@ -3178,19 +3169,19 @@
           <a:lstStyle/>
           <a:p>
             <a:r>
-              <a:rPr lang="en-US" sz="3600" dirty="0" smtClean="0">
+              <a:rPr lang="en-US" sz="3600" dirty="0">
                 <a:latin typeface="Book Antiqua" panose="02040602050305030304" pitchFamily="18" charset="0"/>
               </a:rPr>
               <a:t>EXAM DETAILS </a:t>
             </a:r>
             <a:r>
-              <a:rPr lang="en-US" sz="3600" dirty="0" err="1" smtClean="0">
+              <a:rPr lang="en-US" sz="3600" dirty="0" err="1">
                 <a:latin typeface="Book Antiqua" panose="02040602050305030304" pitchFamily="18" charset="0"/>
               </a:rPr>
               <a:t>cntd</a:t>
             </a:r>
             <a:r>
-              <a:rPr lang="en-US" sz="3600" dirty="0" smtClean="0">
+              <a:rPr lang="en-US" sz="3600" dirty="0">
                 <a:latin typeface="Book Antiqua" panose="02040602050305030304" pitchFamily="18" charset="0"/>
               </a:rPr>
               <a:t>…</a:t>
@@ -3211,13 +3202,6 @@
   <p:clrMapOvr>
     <a:masterClrMapping/>
   </p:clrMapOvr>
-  <p:timing>
-    <p:tnLst>
-      <p:par>
-        <p:cTn id="1" dur="indefinite" restart="never" nodeType="tmRoot"/>
-      </p:par>
-    </p:tnLst>
-  </p:timing>
 </p:sld>
 </file>
 
@@ -3261,7 +3245,7 @@
           <a:lstStyle/>
           <a:p>
             <a:r>
-              <a:rPr lang="en-US" sz="3600" dirty="0" smtClean="0">
+              <a:rPr lang="en-US" sz="3600" dirty="0">
                 <a:latin typeface="Book Antiqua" panose="02040602050305030304" pitchFamily="18" charset="0"/>
               </a:rPr>
               <a:t>Calendar – DAY 1</a:t>
@@ -3272,9 +3256,113 @@
           </a:p>
         </p:txBody>
       </p:sp>
+      <p:sp>
+        <p:nvSpPr>
+          <p:cNvPr id="4" name="TextBox 3"/>
+          <p:cNvSpPr txBox="1"/>
+          <p:nvPr/>
+        </p:nvSpPr>
+        <p:spPr>
+          <a:xfrm>
+            <a:off x="864836" y="4490506"/>
+            <a:ext cx="7585656" cy="1938992"/>
+          </a:xfrm>
+          <a:prstGeom prst="rect">
+            <a:avLst/>
+          </a:prstGeom>
+          <a:noFill/>
+        </p:spPr>
+        <p:txBody>
+          <a:bodyPr wrap="square" rtlCol="0">
+            <a:spAutoFit/>
+          </a:bodyPr>
+          <a:lstStyle/>
+          <a:p>
+            <a:pPr marL="285750" indent="-285750">
+              <a:buFont typeface="Arial" panose="020B0604020202020204" pitchFamily="34" charset="0"/>
+              <a:buChar char="•"/>
+            </a:pPr>
+            <a:r>
+              <a:rPr lang="en-US" sz="2000" dirty="0">
+                <a:latin typeface="Book Antiqua" panose="02040602050305030304" pitchFamily="18" charset="0"/>
+              </a:rPr>
+              <a:t>HUE – Hadoop User Experience</a:t>
+            </a:r>
+          </a:p>
+          <a:p>
+            <a:pPr marL="285750" indent="-285750">
+              <a:buFont typeface="Arial" panose="020B0604020202020204" pitchFamily="34" charset="0"/>
+              <a:buChar char="•"/>
+            </a:pPr>
+            <a:r>
+              <a:rPr lang="en-US" sz="2000" dirty="0">
+                <a:latin typeface="Book Antiqua" panose="02040602050305030304" pitchFamily="18" charset="0"/>
+              </a:rPr>
+              <a:t>Sqoop</a:t>
+            </a:r>
+          </a:p>
+          <a:p>
+            <a:pPr marL="742950" lvl="1" indent="-285750">
+              <a:buFont typeface="Arial" panose="020B0604020202020204" pitchFamily="34" charset="0"/>
+              <a:buChar char="•"/>
+            </a:pPr>
+            <a:r>
+              <a:rPr lang="en-US" sz="2000" dirty="0">
+                <a:latin typeface="Book Antiqua" panose="02040602050305030304" pitchFamily="18" charset="0"/>
+              </a:rPr>
+              <a:t>Import</a:t>
+            </a:r>
+          </a:p>
+          <a:p>
+            <a:pPr marL="742950" lvl="1" indent="-285750">
+              <a:buFont typeface="Arial" panose="020B0604020202020204" pitchFamily="34" charset="0"/>
+              <a:buChar char="•"/>
+            </a:pPr>
+            <a:r>
+              <a:rPr lang="en-US" sz="2000" dirty="0">
+                <a:latin typeface="Book Antiqua" panose="02040602050305030304" pitchFamily="18" charset="0"/>
+              </a:rPr>
+              <a:t>Export</a:t>
+            </a:r>
+          </a:p>
+          <a:p>
+            <a:pPr marL="285750" indent="-285750">
+              <a:buFont typeface="Arial" panose="020B0604020202020204" pitchFamily="34" charset="0"/>
+              <a:buChar char="•"/>
+            </a:pPr>
+            <a:r>
+              <a:rPr lang="en-US" sz="2000" dirty="0">
+                <a:latin typeface="Book Antiqua" panose="02040602050305030304" pitchFamily="18" charset="0"/>
+              </a:rPr>
+              <a:t>Flume</a:t>
+            </a:r>
+          </a:p>
+          <a:p>
+            <a:pPr marL="285750" indent="-285750">
+              <a:buFont typeface="Arial" panose="020B0604020202020204" pitchFamily="34" charset="0"/>
+              <a:buChar char="•"/>
+            </a:pPr>
+            <a:r>
+              <a:rPr lang="en-US" sz="2000" dirty="0">
+                <a:latin typeface="Book Antiqua" panose="02040602050305030304" pitchFamily="18" charset="0"/>
+              </a:rPr>
+              <a:t>Spark Streaming</a:t>
+            </a:r>
+            <a:endParaRPr lang="en-GB" sz="2000" dirty="0">
+              <a:latin typeface="Book Antiqua" panose="02040602050305030304" pitchFamily="18" charset="0"/>
+            </a:endParaRPr>
+          </a:p>
+        </p:txBody>
+      </p:sp>
       <p:pic>
         <p:nvPicPr>
-          <p:cNvPr id="2" name="Picture 1"/>
+          <p:cNvPr id="3" name="Picture 2">
+            <a:extLst>
+              <a:ext uri="{FF2B5EF4-FFF2-40B4-BE49-F238E27FC236}">
+                <a16:creationId xmlns:a16="http://schemas.microsoft.com/office/drawing/2014/main" id="{D5317677-6BE7-41F1-B0CB-8D27C75B15A8}"/>
+              </a:ext>
+            </a:extLst>
+          </p:cNvPr>
           <p:cNvPicPr>
             <a:picLocks noChangeAspect="1"/>
           </p:cNvPicPr>
@@ -3288,91 +3376,14 @@
         </p:blipFill>
         <p:spPr>
           <a:xfrm>
-            <a:off x="700959" y="1298418"/>
-            <a:ext cx="8858250" cy="2638425"/>
+            <a:off x="700087" y="1133430"/>
+            <a:ext cx="10791825" cy="3114675"/>
           </a:xfrm>
           <a:prstGeom prst="rect">
             <a:avLst/>
           </a:prstGeom>
         </p:spPr>
       </p:pic>
-      <p:sp>
-        <p:nvSpPr>
-          <p:cNvPr id="4" name="TextBox 3"/>
-          <p:cNvSpPr txBox="1"/>
-          <p:nvPr/>
-        </p:nvSpPr>
-        <p:spPr>
-          <a:xfrm>
-            <a:off x="837127" y="4739426"/>
-            <a:ext cx="7585656" cy="1323439"/>
-          </a:xfrm>
-          <a:prstGeom prst="rect">
-            <a:avLst/>
-          </a:prstGeom>
-          <a:noFill/>
-        </p:spPr>
-        <p:txBody>
-          <a:bodyPr wrap="square" rtlCol="0">
-            <a:spAutoFit/>
-          </a:bodyPr>
-          <a:lstStyle/>
-          <a:p>
-            <a:pPr marL="285750" indent="-285750">
-              <a:buFont typeface="Arial" panose="020B0604020202020204" pitchFamily="34" charset="0"/>
-              <a:buChar char="•"/>
-            </a:pPr>
-            <a:r>
-              <a:rPr lang="en-US" sz="2000" dirty="0" err="1" smtClean="0">
-                <a:latin typeface="Book Antiqua" panose="02040602050305030304" pitchFamily="18" charset="0"/>
-              </a:rPr>
-              <a:t>Sqoop</a:t>
-            </a:r>
-            <a:endParaRPr lang="en-US" sz="2000" dirty="0" smtClean="0">
-              <a:latin typeface="Book Antiqua" panose="02040602050305030304" pitchFamily="18" charset="0"/>
-            </a:endParaRPr>
-          </a:p>
-          <a:p>
-            <a:pPr marL="742950" lvl="1" indent="-285750">
-              <a:buFont typeface="Arial" panose="020B0604020202020204" pitchFamily="34" charset="0"/>
-              <a:buChar char="•"/>
-            </a:pPr>
-            <a:r>
-              <a:rPr lang="en-US" sz="2000" dirty="0" smtClean="0">
-                <a:latin typeface="Book Antiqua" panose="02040602050305030304" pitchFamily="18" charset="0"/>
-              </a:rPr>
-              <a:t>Import</a:t>
-            </a:r>
-          </a:p>
-          <a:p>
-            <a:pPr marL="742950" lvl="1" indent="-285750">
-              <a:buFont typeface="Arial" panose="020B0604020202020204" pitchFamily="34" charset="0"/>
-              <a:buChar char="•"/>
-            </a:pPr>
-            <a:r>
-              <a:rPr lang="en-US" sz="2000" dirty="0" smtClean="0">
-                <a:latin typeface="Book Antiqua" panose="02040602050305030304" pitchFamily="18" charset="0"/>
-              </a:rPr>
-              <a:t>Export</a:t>
-            </a:r>
-          </a:p>
-          <a:p>
-            <a:pPr marL="285750" indent="-285750">
-              <a:buFont typeface="Arial" panose="020B0604020202020204" pitchFamily="34" charset="0"/>
-              <a:buChar char="•"/>
-            </a:pPr>
-            <a:r>
-              <a:rPr lang="en-US" sz="2000" dirty="0" smtClean="0">
-                <a:latin typeface="Book Antiqua" panose="02040602050305030304" pitchFamily="18" charset="0"/>
-              </a:rPr>
-              <a:t>Flume</a:t>
-            </a:r>
-            <a:endParaRPr lang="en-GB" sz="2000" dirty="0">
-              <a:latin typeface="Book Antiqua" panose="02040602050305030304" pitchFamily="18" charset="0"/>
-            </a:endParaRPr>
-          </a:p>
-        </p:txBody>
-      </p:sp>
     </p:spTree>
     <p:extLst>
       <p:ext uri="{BB962C8B-B14F-4D97-AF65-F5344CB8AC3E}">
@@ -3383,13 +3394,6 @@
   <p:clrMapOvr>
     <a:masterClrMapping/>
   </p:clrMapOvr>
-  <p:timing>
-    <p:tnLst>
-      <p:par>
-        <p:cTn id="1" dur="indefinite" restart="never" nodeType="tmRoot"/>
-      </p:par>
-    </p:tnLst>
-  </p:timing>
 </p:sld>
 </file>
 
@@ -3433,7 +3437,7 @@
           <a:lstStyle/>
           <a:p>
             <a:r>
-              <a:rPr lang="en-US" sz="3600" dirty="0" smtClean="0">
+              <a:rPr lang="en-US" sz="3600" dirty="0">
                 <a:latin typeface="Book Antiqua" panose="02040602050305030304" pitchFamily="18" charset="0"/>
               </a:rPr>
               <a:t>Calendar – DAY 2</a:t>
@@ -3444,9 +3448,74 @@
           </a:p>
         </p:txBody>
       </p:sp>
+      <p:sp>
+        <p:nvSpPr>
+          <p:cNvPr id="7" name="TextBox 6"/>
+          <p:cNvSpPr txBox="1"/>
+          <p:nvPr/>
+        </p:nvSpPr>
+        <p:spPr>
+          <a:xfrm>
+            <a:off x="720956" y="4250334"/>
+            <a:ext cx="7585656" cy="1015663"/>
+          </a:xfrm>
+          <a:prstGeom prst="rect">
+            <a:avLst/>
+          </a:prstGeom>
+          <a:noFill/>
+        </p:spPr>
+        <p:txBody>
+          <a:bodyPr wrap="square" rtlCol="0">
+            <a:spAutoFit/>
+          </a:bodyPr>
+          <a:lstStyle/>
+          <a:p>
+            <a:pPr marL="285750" indent="-285750">
+              <a:buFont typeface="Arial" panose="020B0604020202020204" pitchFamily="34" charset="0"/>
+              <a:buChar char="•"/>
+            </a:pPr>
+            <a:r>
+              <a:rPr lang="en-US" sz="2000" dirty="0">
+                <a:latin typeface="Book Antiqua" panose="02040602050305030304" pitchFamily="18" charset="0"/>
+              </a:rPr>
+              <a:t>Spark Core </a:t>
+            </a:r>
+          </a:p>
+          <a:p>
+            <a:pPr marL="285750" indent="-285750">
+              <a:buFont typeface="Arial" panose="020B0604020202020204" pitchFamily="34" charset="0"/>
+              <a:buChar char="•"/>
+            </a:pPr>
+            <a:r>
+              <a:rPr lang="en-US" sz="2000" dirty="0">
+                <a:latin typeface="Book Antiqua" panose="02040602050305030304" pitchFamily="18" charset="0"/>
+              </a:rPr>
+              <a:t>Read and Writing RDDs</a:t>
+            </a:r>
+          </a:p>
+          <a:p>
+            <a:pPr marL="285750" indent="-285750">
+              <a:buFont typeface="Arial" panose="020B0604020202020204" pitchFamily="34" charset="0"/>
+              <a:buChar char="•"/>
+            </a:pPr>
+            <a:r>
+              <a:rPr lang="en-US" sz="2000" dirty="0">
+                <a:latin typeface="Book Antiqua" panose="02040602050305030304" pitchFamily="18" charset="0"/>
+              </a:rPr>
+              <a:t>Transformations and Actions</a:t>
+            </a:r>
+          </a:p>
+        </p:txBody>
+      </p:sp>
       <p:pic>
         <p:nvPicPr>
-          <p:cNvPr id="6" name="Picture 5"/>
+          <p:cNvPr id="2" name="Picture 1">
+            <a:extLst>
+              <a:ext uri="{FF2B5EF4-FFF2-40B4-BE49-F238E27FC236}">
+                <a16:creationId xmlns:a16="http://schemas.microsoft.com/office/drawing/2014/main" id="{6E2AC74D-3199-403C-A49C-EE4AE4455731}"/>
+              </a:ext>
+            </a:extLst>
+          </p:cNvPr>
           <p:cNvPicPr>
             <a:picLocks noChangeAspect="1"/>
           </p:cNvPicPr>
@@ -3460,133 +3529,14 @@
         </p:blipFill>
         <p:spPr>
           <a:xfrm>
-            <a:off x="632943" y="1307608"/>
-            <a:ext cx="9715500" cy="2800350"/>
+            <a:off x="103507" y="1176712"/>
+            <a:ext cx="11229975" cy="2390775"/>
           </a:xfrm>
           <a:prstGeom prst="rect">
             <a:avLst/>
           </a:prstGeom>
         </p:spPr>
       </p:pic>
-      <p:sp>
-        <p:nvSpPr>
-          <p:cNvPr id="7" name="TextBox 6"/>
-          <p:cNvSpPr txBox="1"/>
-          <p:nvPr/>
-        </p:nvSpPr>
-        <p:spPr>
-          <a:xfrm>
-            <a:off x="785611" y="4485900"/>
-            <a:ext cx="7585656" cy="2246769"/>
-          </a:xfrm>
-          <a:prstGeom prst="rect">
-            <a:avLst/>
-          </a:prstGeom>
-          <a:noFill/>
-        </p:spPr>
-        <p:txBody>
-          <a:bodyPr wrap="square" rtlCol="0">
-            <a:spAutoFit/>
-          </a:bodyPr>
-          <a:lstStyle/>
-          <a:p>
-            <a:pPr marL="285750" indent="-285750">
-              <a:buFont typeface="Arial" panose="020B0604020202020204" pitchFamily="34" charset="0"/>
-              <a:buChar char="•"/>
-            </a:pPr>
-            <a:r>
-              <a:rPr lang="en-US" sz="2000" dirty="0" smtClean="0">
-                <a:latin typeface="Book Antiqua" panose="02040602050305030304" pitchFamily="18" charset="0"/>
-              </a:rPr>
-              <a:t>Hive</a:t>
-            </a:r>
-          </a:p>
-          <a:p>
-            <a:pPr marL="742950" lvl="1" indent="-285750">
-              <a:buFont typeface="Arial" panose="020B0604020202020204" pitchFamily="34" charset="0"/>
-              <a:buChar char="•"/>
-            </a:pPr>
-            <a:r>
-              <a:rPr lang="en-US" sz="2000" dirty="0" smtClean="0">
-                <a:latin typeface="Book Antiqua" panose="02040602050305030304" pitchFamily="18" charset="0"/>
-              </a:rPr>
-              <a:t>Create/Read Hive table</a:t>
-            </a:r>
-          </a:p>
-          <a:p>
-            <a:pPr marL="742950" lvl="1" indent="-285750">
-              <a:buFont typeface="Arial" panose="020B0604020202020204" pitchFamily="34" charset="0"/>
-              <a:buChar char="•"/>
-            </a:pPr>
-            <a:r>
-              <a:rPr lang="en-US" sz="2000" dirty="0" smtClean="0">
-                <a:latin typeface="Book Antiqua" panose="02040602050305030304" pitchFamily="18" charset="0"/>
-              </a:rPr>
-              <a:t>Create/Read Hive table from Avro schema </a:t>
-            </a:r>
-            <a:r>
-              <a:rPr lang="en-US" sz="2000" dirty="0" smtClean="0">
-                <a:latin typeface="Book Antiqua" panose="02040602050305030304" pitchFamily="18" charset="0"/>
-              </a:rPr>
-              <a:t>file</a:t>
-            </a:r>
-          </a:p>
-          <a:p>
-            <a:pPr marL="742950" lvl="1" indent="-285750">
-              <a:buFont typeface="Arial" panose="020B0604020202020204" pitchFamily="34" charset="0"/>
-              <a:buChar char="•"/>
-            </a:pPr>
-            <a:r>
-              <a:rPr lang="en-US" sz="2000" dirty="0" smtClean="0">
-                <a:latin typeface="Book Antiqua" panose="02040602050305030304" pitchFamily="18" charset="0"/>
-              </a:rPr>
-              <a:t>Create/Read Hive table in Parquet format </a:t>
-            </a:r>
-            <a:endParaRPr lang="en-US" sz="2000" dirty="0" smtClean="0">
-              <a:latin typeface="Book Antiqua" panose="02040602050305030304" pitchFamily="18" charset="0"/>
-            </a:endParaRPr>
-          </a:p>
-          <a:p>
-            <a:pPr marL="742950" lvl="1" indent="-285750">
-              <a:buFont typeface="Arial" panose="020B0604020202020204" pitchFamily="34" charset="0"/>
-              <a:buChar char="•"/>
-            </a:pPr>
-            <a:r>
-              <a:rPr lang="en-US" sz="2000" dirty="0" smtClean="0">
-                <a:latin typeface="Book Antiqua" panose="02040602050305030304" pitchFamily="18" charset="0"/>
-              </a:rPr>
-              <a:t>Partitioning</a:t>
-            </a:r>
-          </a:p>
-          <a:p>
-            <a:pPr marL="285750" indent="-285750">
-              <a:buFont typeface="Arial" panose="020B0604020202020204" pitchFamily="34" charset="0"/>
-              <a:buChar char="•"/>
-            </a:pPr>
-            <a:r>
-              <a:rPr lang="en-US" sz="2000" dirty="0" smtClean="0">
-                <a:latin typeface="Book Antiqua" panose="02040602050305030304" pitchFamily="18" charset="0"/>
-              </a:rPr>
-              <a:t>Impala</a:t>
-            </a:r>
-          </a:p>
-          <a:p>
-            <a:pPr marL="285750" indent="-285750">
-              <a:buFont typeface="Arial" panose="020B0604020202020204" pitchFamily="34" charset="0"/>
-              <a:buChar char="•"/>
-            </a:pPr>
-            <a:r>
-              <a:rPr lang="en-US" sz="2000" dirty="0" smtClean="0">
-                <a:latin typeface="Book Antiqua" panose="02040602050305030304" pitchFamily="18" charset="0"/>
-              </a:rPr>
-              <a:t>HUE – Hadoop User Experience</a:t>
-            </a:r>
-            <a:endParaRPr lang="en-GB" sz="2000" dirty="0">
-              <a:latin typeface="Book Antiqua" panose="02040602050305030304" pitchFamily="18" charset="0"/>
-            </a:endParaRPr>
-          </a:p>
-        </p:txBody>
-      </p:sp>
     </p:spTree>
     <p:extLst>
       <p:ext uri="{BB962C8B-B14F-4D97-AF65-F5344CB8AC3E}">
@@ -3597,13 +3547,6 @@
   <p:clrMapOvr>
     <a:masterClrMapping/>
   </p:clrMapOvr>
-  <p:timing>
-    <p:tnLst>
-      <p:par>
-        <p:cTn id="1" dur="indefinite" restart="never" nodeType="tmRoot"/>
-      </p:par>
-    </p:tnLst>
-  </p:timing>
 </p:sld>
 </file>
 
@@ -3647,20 +3590,73 @@
           <a:lstStyle/>
           <a:p>
             <a:r>
-              <a:rPr lang="en-US" sz="3600" dirty="0" smtClean="0">
+              <a:rPr lang="en-US" sz="3600" dirty="0">
                 <a:latin typeface="Book Antiqua" panose="02040602050305030304" pitchFamily="18" charset="0"/>
               </a:rPr>
               <a:t>Calendar – DAY 3</a:t>
             </a:r>
-            <a:endParaRPr lang="en-GB" sz="3600" dirty="0" smtClean="0">
+            <a:endParaRPr lang="en-GB" sz="3600" dirty="0">
               <a:latin typeface="Book Antiqua" panose="02040602050305030304" pitchFamily="18" charset="0"/>
             </a:endParaRPr>
           </a:p>
         </p:txBody>
       </p:sp>
+      <p:sp>
+        <p:nvSpPr>
+          <p:cNvPr id="4" name="TextBox 3"/>
+          <p:cNvSpPr txBox="1"/>
+          <p:nvPr/>
+        </p:nvSpPr>
+        <p:spPr>
+          <a:xfrm>
+            <a:off x="677507" y="5440451"/>
+            <a:ext cx="7585656" cy="707886"/>
+          </a:xfrm>
+          <a:prstGeom prst="rect">
+            <a:avLst/>
+          </a:prstGeom>
+          <a:noFill/>
+        </p:spPr>
+        <p:txBody>
+          <a:bodyPr wrap="square" rtlCol="0">
+            <a:spAutoFit/>
+          </a:bodyPr>
+          <a:lstStyle/>
+          <a:p>
+            <a:pPr marL="285750" indent="-285750">
+              <a:buFont typeface="Arial" panose="020B0604020202020204" pitchFamily="34" charset="0"/>
+              <a:buChar char="•"/>
+            </a:pPr>
+            <a:r>
+              <a:rPr lang="en-US" sz="2000" dirty="0">
+                <a:latin typeface="Book Antiqua" panose="02040602050305030304" pitchFamily="18" charset="0"/>
+              </a:rPr>
+              <a:t>Spark SQL</a:t>
+            </a:r>
+          </a:p>
+          <a:p>
+            <a:pPr marL="285750" indent="-285750">
+              <a:buFont typeface="Arial" panose="020B0604020202020204" pitchFamily="34" charset="0"/>
+              <a:buChar char="•"/>
+            </a:pPr>
+            <a:r>
+              <a:rPr lang="en-US" sz="2000" dirty="0">
+                <a:latin typeface="Book Antiqua" panose="02040602050305030304" pitchFamily="18" charset="0"/>
+              </a:rPr>
+              <a:t>Spark Configurations</a:t>
+            </a:r>
+          </a:p>
+        </p:txBody>
+      </p:sp>
       <p:pic>
         <p:nvPicPr>
-          <p:cNvPr id="2" name="Picture 1"/>
+          <p:cNvPr id="3" name="Picture 2">
+            <a:extLst>
+              <a:ext uri="{FF2B5EF4-FFF2-40B4-BE49-F238E27FC236}">
+                <a16:creationId xmlns:a16="http://schemas.microsoft.com/office/drawing/2014/main" id="{FA1E8770-6DC1-4DE1-808D-FF837EBD978B}"/>
+              </a:ext>
+            </a:extLst>
+          </p:cNvPr>
           <p:cNvPicPr>
             <a:picLocks noChangeAspect="1"/>
           </p:cNvPicPr>
@@ -3674,76 +3670,14 @@
         </p:blipFill>
         <p:spPr>
           <a:xfrm>
-            <a:off x="321167" y="1179356"/>
-            <a:ext cx="11163300" cy="2876550"/>
+            <a:off x="284450" y="823479"/>
+            <a:ext cx="11676641" cy="4324350"/>
           </a:xfrm>
           <a:prstGeom prst="rect">
             <a:avLst/>
           </a:prstGeom>
         </p:spPr>
       </p:pic>
-      <p:sp>
-        <p:nvSpPr>
-          <p:cNvPr id="4" name="TextBox 3"/>
-          <p:cNvSpPr txBox="1"/>
-          <p:nvPr/>
-        </p:nvSpPr>
-        <p:spPr>
-          <a:xfrm>
-            <a:off x="566671" y="4344233"/>
-            <a:ext cx="7585656" cy="1015663"/>
-          </a:xfrm>
-          <a:prstGeom prst="rect">
-            <a:avLst/>
-          </a:prstGeom>
-          <a:noFill/>
-        </p:spPr>
-        <p:txBody>
-          <a:bodyPr wrap="square" rtlCol="0">
-            <a:spAutoFit/>
-          </a:bodyPr>
-          <a:lstStyle/>
-          <a:p>
-            <a:pPr marL="285750" indent="-285750">
-              <a:buFont typeface="Arial" panose="020B0604020202020204" pitchFamily="34" charset="0"/>
-              <a:buChar char="•"/>
-            </a:pPr>
-            <a:r>
-              <a:rPr lang="en-US" sz="2000" dirty="0" smtClean="0">
-                <a:latin typeface="Book Antiqua" panose="02040602050305030304" pitchFamily="18" charset="0"/>
-              </a:rPr>
-              <a:t>Spark</a:t>
-            </a:r>
-          </a:p>
-          <a:p>
-            <a:pPr marL="742950" lvl="1" indent="-285750">
-              <a:buFont typeface="Arial" panose="020B0604020202020204" pitchFamily="34" charset="0"/>
-              <a:buChar char="•"/>
-            </a:pPr>
-            <a:r>
-              <a:rPr lang="en-US" sz="2000" dirty="0" smtClean="0">
-                <a:latin typeface="Book Antiqua" panose="02040602050305030304" pitchFamily="18" charset="0"/>
-              </a:rPr>
-              <a:t>Using Scala</a:t>
-            </a:r>
-          </a:p>
-          <a:p>
-            <a:pPr marL="742950" lvl="1" indent="-285750">
-              <a:buFont typeface="Arial" panose="020B0604020202020204" pitchFamily="34" charset="0"/>
-              <a:buChar char="•"/>
-            </a:pPr>
-            <a:r>
-              <a:rPr lang="en-US" sz="2000" dirty="0" smtClean="0">
-                <a:latin typeface="Book Antiqua" panose="02040602050305030304" pitchFamily="18" charset="0"/>
-              </a:rPr>
-              <a:t>Using python</a:t>
-            </a:r>
-            <a:endParaRPr lang="en-GB" sz="2000" dirty="0">
-              <a:latin typeface="Book Antiqua" panose="02040602050305030304" pitchFamily="18" charset="0"/>
-            </a:endParaRPr>
-          </a:p>
-        </p:txBody>
-      </p:sp>
     </p:spTree>
     <p:extLst>
       <p:ext uri="{BB962C8B-B14F-4D97-AF65-F5344CB8AC3E}">
@@ -3754,13 +3688,6 @@
   <p:clrMapOvr>
     <a:masterClrMapping/>
   </p:clrMapOvr>
-  <p:timing>
-    <p:tnLst>
-      <p:par>
-        <p:cTn id="1" dur="indefinite" restart="never" nodeType="tmRoot"/>
-      </p:par>
-    </p:tnLst>
-  </p:timing>
 </p:sld>
 </file>
 
@@ -3804,10 +3731,10 @@
           <a:lstStyle/>
           <a:p>
             <a:r>
-              <a:rPr lang="en-US" sz="3600" dirty="0" smtClean="0">
+              <a:rPr lang="en-US" sz="3600" dirty="0">
                 <a:latin typeface="Book Antiqua" panose="02040602050305030304" pitchFamily="18" charset="0"/>
               </a:rPr>
-              <a:t>Calendar – DAY 4</a:t>
+              <a:t>Cluster Environment</a:t>
             </a:r>
             <a:endParaRPr lang="en-GB" sz="3600" dirty="0">
               <a:latin typeface="Book Antiqua" panose="02040602050305030304" pitchFamily="18" charset="0"/>
@@ -3815,9 +3742,45 @@
           </a:p>
         </p:txBody>
       </p:sp>
+      <p:sp>
+        <p:nvSpPr>
+          <p:cNvPr id="6" name="TextBox 5"/>
+          <p:cNvSpPr txBox="1"/>
+          <p:nvPr/>
+        </p:nvSpPr>
+        <p:spPr>
+          <a:xfrm>
+            <a:off x="682176" y="6197600"/>
+            <a:ext cx="10290629" cy="369332"/>
+          </a:xfrm>
+          <a:prstGeom prst="rect">
+            <a:avLst/>
+          </a:prstGeom>
+          <a:noFill/>
+        </p:spPr>
+        <p:txBody>
+          <a:bodyPr wrap="square" rtlCol="0">
+            <a:spAutoFit/>
+          </a:bodyPr>
+          <a:lstStyle/>
+          <a:p>
+            <a:r>
+              <a:rPr lang="en-US" i="1" dirty="0"/>
+              <a:t>** Don’t be overwhelmed, you really need only a few…</a:t>
+            </a:r>
+            <a:endParaRPr lang="en-GB" i="1" dirty="0"/>
+          </a:p>
+        </p:txBody>
+      </p:sp>
       <p:pic>
         <p:nvPicPr>
-          <p:cNvPr id="2" name="Picture 1"/>
+          <p:cNvPr id="2" name="Picture 1">
+            <a:extLst>
+              <a:ext uri="{FF2B5EF4-FFF2-40B4-BE49-F238E27FC236}">
+                <a16:creationId xmlns:a16="http://schemas.microsoft.com/office/drawing/2014/main" id="{F0DB6FA4-FA1B-413E-8F21-12C927C174BA}"/>
+              </a:ext>
+            </a:extLst>
+          </p:cNvPr>
           <p:cNvPicPr>
             <a:picLocks noChangeAspect="1"/>
           </p:cNvPicPr>
@@ -3831,102 +3794,24 @@
         </p:blipFill>
         <p:spPr>
           <a:xfrm>
-            <a:off x="461962" y="1032926"/>
-            <a:ext cx="8715375" cy="2886075"/>
+            <a:off x="378618" y="1201594"/>
+            <a:ext cx="11434763" cy="1849337"/>
           </a:xfrm>
           <a:prstGeom prst="rect">
             <a:avLst/>
           </a:prstGeom>
         </p:spPr>
       </p:pic>
-      <p:sp>
-        <p:nvSpPr>
-          <p:cNvPr id="4" name="TextBox 3"/>
-          <p:cNvSpPr txBox="1"/>
-          <p:nvPr/>
-        </p:nvSpPr>
-        <p:spPr>
-          <a:xfrm>
-            <a:off x="643944" y="4292717"/>
-            <a:ext cx="7585656" cy="1323439"/>
-          </a:xfrm>
-          <a:prstGeom prst="rect">
-            <a:avLst/>
-          </a:prstGeom>
-          <a:noFill/>
-        </p:spPr>
-        <p:txBody>
-          <a:bodyPr wrap="square" rtlCol="0">
-            <a:spAutoFit/>
-          </a:bodyPr>
-          <a:lstStyle/>
-          <a:p>
-            <a:pPr marL="285750" indent="-285750">
-              <a:buFont typeface="Arial" panose="020B0604020202020204" pitchFamily="34" charset="0"/>
-              <a:buChar char="•"/>
-            </a:pPr>
-            <a:r>
-              <a:rPr lang="en-US" sz="2000" dirty="0" smtClean="0">
-                <a:latin typeface="Book Antiqua" panose="02040602050305030304" pitchFamily="18" charset="0"/>
-              </a:rPr>
-              <a:t>Avro schema evolution</a:t>
-            </a:r>
-            <a:endParaRPr lang="en-GB" sz="2000" dirty="0" smtClean="0">
-              <a:latin typeface="Book Antiqua" panose="02040602050305030304" pitchFamily="18" charset="0"/>
-            </a:endParaRPr>
-          </a:p>
-          <a:p>
-            <a:pPr marL="285750" indent="-285750">
-              <a:buFont typeface="Arial" panose="020B0604020202020204" pitchFamily="34" charset="0"/>
-              <a:buChar char="•"/>
-            </a:pPr>
-            <a:r>
-              <a:rPr lang="en-US" sz="2000" dirty="0" smtClean="0">
-                <a:latin typeface="Book Antiqua" panose="02040602050305030304" pitchFamily="18" charset="0"/>
-              </a:rPr>
-              <a:t>Avro tools</a:t>
-            </a:r>
-          </a:p>
-          <a:p>
-            <a:pPr marL="285750" indent="-285750">
-              <a:buFont typeface="Arial" panose="020B0604020202020204" pitchFamily="34" charset="0"/>
-              <a:buChar char="•"/>
-            </a:pPr>
-            <a:endParaRPr lang="en-US" sz="2000" dirty="0" smtClean="0">
-              <a:latin typeface="Book Antiqua" panose="02040602050305030304" pitchFamily="18" charset="0"/>
-            </a:endParaRPr>
-          </a:p>
-          <a:p>
-            <a:pPr marL="285750" indent="-285750">
-              <a:buFont typeface="Arial" panose="020B0604020202020204" pitchFamily="34" charset="0"/>
-              <a:buChar char="•"/>
-            </a:pPr>
-            <a:r>
-              <a:rPr lang="en-US" sz="2000" dirty="0" smtClean="0">
-                <a:latin typeface="Book Antiqua" panose="02040602050305030304" pitchFamily="18" charset="0"/>
-              </a:rPr>
-              <a:t>Exam hints and tips</a:t>
-            </a:r>
-          </a:p>
-        </p:txBody>
-      </p:sp>
     </p:spTree>
     <p:extLst>
       <p:ext uri="{BB962C8B-B14F-4D97-AF65-F5344CB8AC3E}">
-        <p14:creationId xmlns:p14="http://schemas.microsoft.com/office/powerpoint/2010/main" val="3451300724"/>
+        <p14:creationId xmlns:p14="http://schemas.microsoft.com/office/powerpoint/2010/main" val="1770789959"/>
       </p:ext>
     </p:extLst>
   </p:cSld>
   <p:clrMapOvr>
     <a:masterClrMapping/>
   </p:clrMapOvr>
-  <p:timing>
-    <p:tnLst>
-      <p:par>
-        <p:cTn id="1" dur="indefinite" restart="never" nodeType="tmRoot"/>
-      </p:par>
-    </p:tnLst>
-  </p:timing>
 </p:sld>
 </file>
 
@@ -3970,132 +3855,7 @@
           <a:lstStyle/>
           <a:p>
             <a:r>
-              <a:rPr lang="en-US" sz="3600" dirty="0" smtClean="0">
-                <a:latin typeface="Book Antiqua" panose="02040602050305030304" pitchFamily="18" charset="0"/>
-              </a:rPr>
-              <a:t>Cluster Environment</a:t>
-            </a:r>
-            <a:endParaRPr lang="en-GB" sz="3600" dirty="0">
-              <a:latin typeface="Book Antiqua" panose="02040602050305030304" pitchFamily="18" charset="0"/>
-            </a:endParaRPr>
-          </a:p>
-        </p:txBody>
-      </p:sp>
-      <p:pic>
-        <p:nvPicPr>
-          <p:cNvPr id="3" name="Picture 2"/>
-          <p:cNvPicPr>
-            <a:picLocks noChangeAspect="1"/>
-          </p:cNvPicPr>
-          <p:nvPr/>
-        </p:nvPicPr>
-        <p:blipFill>
-          <a:blip r:embed="rId2"/>
-          <a:stretch>
-            <a:fillRect/>
-          </a:stretch>
-        </p:blipFill>
-        <p:spPr>
-          <a:xfrm>
-            <a:off x="609264" y="1284600"/>
-            <a:ext cx="11153775" cy="2047875"/>
-          </a:xfrm>
-          <a:prstGeom prst="rect">
-            <a:avLst/>
-          </a:prstGeom>
-        </p:spPr>
-      </p:pic>
-      <p:sp>
-        <p:nvSpPr>
-          <p:cNvPr id="6" name="TextBox 5"/>
-          <p:cNvSpPr txBox="1"/>
-          <p:nvPr/>
-        </p:nvSpPr>
-        <p:spPr>
-          <a:xfrm>
-            <a:off x="682176" y="6197600"/>
-            <a:ext cx="10290629" cy="369332"/>
-          </a:xfrm>
-          <a:prstGeom prst="rect">
-            <a:avLst/>
-          </a:prstGeom>
-          <a:noFill/>
-        </p:spPr>
-        <p:txBody>
-          <a:bodyPr wrap="square" rtlCol="0">
-            <a:spAutoFit/>
-          </a:bodyPr>
-          <a:lstStyle/>
-          <a:p>
-            <a:r>
-              <a:rPr lang="en-US" i="1" dirty="0" smtClean="0"/>
-              <a:t>** Don’t be overwhelmed, you really need only a few…</a:t>
-            </a:r>
-            <a:endParaRPr lang="en-GB" i="1" dirty="0"/>
-          </a:p>
-        </p:txBody>
-      </p:sp>
-    </p:spTree>
-    <p:extLst>
-      <p:ext uri="{BB962C8B-B14F-4D97-AF65-F5344CB8AC3E}">
-        <p14:creationId xmlns:p14="http://schemas.microsoft.com/office/powerpoint/2010/main" val="1770789959"/>
-      </p:ext>
-    </p:extLst>
-  </p:cSld>
-  <p:clrMapOvr>
-    <a:masterClrMapping/>
-  </p:clrMapOvr>
-  <p:timing>
-    <p:tnLst>
-      <p:par>
-        <p:cTn id="1" dur="indefinite" restart="never" nodeType="tmRoot"/>
-      </p:par>
-    </p:tnLst>
-  </p:timing>
-</p:sld>
-</file>
-
-<file path=ppt/slides/slide9.xml><?xml version="1.0" encoding="utf-8"?>
-<p:sld xmlns:a="http://schemas.openxmlformats.org/drawingml/2006/main" xmlns:r="http://schemas.openxmlformats.org/officeDocument/2006/relationships" xmlns:p="http://schemas.openxmlformats.org/presentationml/2006/main">
-  <p:cSld>
-    <p:spTree>
-      <p:nvGrpSpPr>
-        <p:cNvPr id="1" name=""/>
-        <p:cNvGrpSpPr/>
-        <p:nvPr/>
-      </p:nvGrpSpPr>
-      <p:grpSpPr>
-        <a:xfrm>
-          <a:off x="0" y="0"/>
-          <a:ext cx="0" cy="0"/>
-          <a:chOff x="0" y="0"/>
-          <a:chExt cx="0" cy="0"/>
-        </a:xfrm>
-      </p:grpSpPr>
-      <p:sp>
-        <p:nvSpPr>
-          <p:cNvPr id="5" name="TextBox 4"/>
-          <p:cNvSpPr txBox="1"/>
-          <p:nvPr/>
-        </p:nvSpPr>
-        <p:spPr>
-          <a:xfrm>
-            <a:off x="461962" y="244698"/>
-            <a:ext cx="10386208" cy="646331"/>
-          </a:xfrm>
-          <a:prstGeom prst="rect">
-            <a:avLst/>
-          </a:prstGeom>
-          <a:noFill/>
-        </p:spPr>
-        <p:txBody>
-          <a:bodyPr wrap="square" rtlCol="0">
-            <a:spAutoFit/>
-          </a:bodyPr>
-          <a:lstStyle/>
-          <a:p>
-            <a:r>
-              <a:rPr lang="en-US" sz="3600" dirty="0" smtClean="0">
+              <a:rPr lang="en-US" sz="3600" dirty="0">
                 <a:latin typeface="Book Antiqua" panose="02040602050305030304" pitchFamily="18" charset="0"/>
               </a:rPr>
               <a:t>Exam Environment</a:t>
@@ -4140,13 +3900,6 @@
   <p:clrMapOvr>
     <a:masterClrMapping/>
   </p:clrMapOvr>
-  <p:timing>
-    <p:tnLst>
-      <p:par>
-        <p:cTn id="1" dur="indefinite" restart="never" nodeType="tmRoot"/>
-      </p:par>
-    </p:tnLst>
-  </p:timing>
 </p:sld>
 </file>
 

</xml_diff>